<commit_message>
update model, add explanations of mechanics
</commit_message>
<xml_diff>
--- a/Model.pptx
+++ b/Model.pptx
@@ -11,11 +11,12 @@
     <p:sldId id="258" r:id="rId8"/>
     <p:sldId id="262" r:id="rId9"/>
     <p:sldId id="259" r:id="rId10"/>
-    <p:sldId id="264" r:id="rId11"/>
-    <p:sldId id="263" r:id="rId12"/>
-    <p:sldId id="265" r:id="rId13"/>
-    <p:sldId id="270" r:id="rId14"/>
-    <p:sldId id="271" r:id="rId15"/>
+    <p:sldId id="272" r:id="rId11"/>
+    <p:sldId id="273" r:id="rId12"/>
+    <p:sldId id="263" r:id="rId13"/>
+    <p:sldId id="265" r:id="rId14"/>
+    <p:sldId id="270" r:id="rId15"/>
+    <p:sldId id="271" r:id="rId16"/>
   </p:sldIdLst>
   <p:sldSz cx="12192000" cy="6858000"/>
   <p:notesSz cx="6858000" cy="9144000"/>
@@ -251,7 +252,7 @@
           <a:p>
             <a:fld id="{D3EB3054-B75A-4BD7-8B3E-8DC0F614FAF3}" type="datetimeFigureOut">
               <a:rPr lang="de-DE" smtClean="0"/>
-              <a:t>24.10.2020</a:t>
+              <a:t>26.10.2020</a:t>
             </a:fld>
             <a:endParaRPr lang="de-DE"/>
           </a:p>
@@ -419,7 +420,7 @@
           <a:p>
             <a:fld id="{D3EB3054-B75A-4BD7-8B3E-8DC0F614FAF3}" type="datetimeFigureOut">
               <a:rPr lang="de-DE" smtClean="0"/>
-              <a:t>24.10.2020</a:t>
+              <a:t>26.10.2020</a:t>
             </a:fld>
             <a:endParaRPr lang="de-DE"/>
           </a:p>
@@ -597,7 +598,7 @@
           <a:p>
             <a:fld id="{D3EB3054-B75A-4BD7-8B3E-8DC0F614FAF3}" type="datetimeFigureOut">
               <a:rPr lang="de-DE" smtClean="0"/>
-              <a:t>24.10.2020</a:t>
+              <a:t>26.10.2020</a:t>
             </a:fld>
             <a:endParaRPr lang="de-DE"/>
           </a:p>
@@ -765,7 +766,7 @@
           <a:p>
             <a:fld id="{D3EB3054-B75A-4BD7-8B3E-8DC0F614FAF3}" type="datetimeFigureOut">
               <a:rPr lang="de-DE" smtClean="0"/>
-              <a:t>24.10.2020</a:t>
+              <a:t>26.10.2020</a:t>
             </a:fld>
             <a:endParaRPr lang="de-DE"/>
           </a:p>
@@ -1010,7 +1011,7 @@
           <a:p>
             <a:fld id="{D3EB3054-B75A-4BD7-8B3E-8DC0F614FAF3}" type="datetimeFigureOut">
               <a:rPr lang="de-DE" smtClean="0"/>
-              <a:t>24.10.2020</a:t>
+              <a:t>26.10.2020</a:t>
             </a:fld>
             <a:endParaRPr lang="de-DE"/>
           </a:p>
@@ -1239,7 +1240,7 @@
           <a:p>
             <a:fld id="{D3EB3054-B75A-4BD7-8B3E-8DC0F614FAF3}" type="datetimeFigureOut">
               <a:rPr lang="de-DE" smtClean="0"/>
-              <a:t>24.10.2020</a:t>
+              <a:t>26.10.2020</a:t>
             </a:fld>
             <a:endParaRPr lang="de-DE"/>
           </a:p>
@@ -1603,7 +1604,7 @@
           <a:p>
             <a:fld id="{D3EB3054-B75A-4BD7-8B3E-8DC0F614FAF3}" type="datetimeFigureOut">
               <a:rPr lang="de-DE" smtClean="0"/>
-              <a:t>24.10.2020</a:t>
+              <a:t>26.10.2020</a:t>
             </a:fld>
             <a:endParaRPr lang="de-DE"/>
           </a:p>
@@ -1720,7 +1721,7 @@
           <a:p>
             <a:fld id="{D3EB3054-B75A-4BD7-8B3E-8DC0F614FAF3}" type="datetimeFigureOut">
               <a:rPr lang="de-DE" smtClean="0"/>
-              <a:t>24.10.2020</a:t>
+              <a:t>26.10.2020</a:t>
             </a:fld>
             <a:endParaRPr lang="de-DE"/>
           </a:p>
@@ -1815,7 +1816,7 @@
           <a:p>
             <a:fld id="{D3EB3054-B75A-4BD7-8B3E-8DC0F614FAF3}" type="datetimeFigureOut">
               <a:rPr lang="de-DE" smtClean="0"/>
-              <a:t>24.10.2020</a:t>
+              <a:t>26.10.2020</a:t>
             </a:fld>
             <a:endParaRPr lang="de-DE"/>
           </a:p>
@@ -2090,7 +2091,7 @@
           <a:p>
             <a:fld id="{D3EB3054-B75A-4BD7-8B3E-8DC0F614FAF3}" type="datetimeFigureOut">
               <a:rPr lang="de-DE" smtClean="0"/>
-              <a:t>24.10.2020</a:t>
+              <a:t>26.10.2020</a:t>
             </a:fld>
             <a:endParaRPr lang="de-DE"/>
           </a:p>
@@ -2342,7 +2343,7 @@
           <a:p>
             <a:fld id="{D3EB3054-B75A-4BD7-8B3E-8DC0F614FAF3}" type="datetimeFigureOut">
               <a:rPr lang="de-DE" smtClean="0"/>
-              <a:t>24.10.2020</a:t>
+              <a:t>26.10.2020</a:t>
             </a:fld>
             <a:endParaRPr lang="de-DE"/>
           </a:p>
@@ -2553,7 +2554,7 @@
           <a:p>
             <a:fld id="{D3EB3054-B75A-4BD7-8B3E-8DC0F614FAF3}" type="datetimeFigureOut">
               <a:rPr lang="de-DE" smtClean="0"/>
-              <a:t>24.10.2020</a:t>
+              <a:t>26.10.2020</a:t>
             </a:fld>
             <a:endParaRPr lang="de-DE"/>
           </a:p>
@@ -3049,6 +3050,215 @@
           <p:cNvPr id="2" name="Title 1">
             <a:extLst>
               <a:ext uri="{FF2B5EF4-FFF2-40B4-BE49-F238E27FC236}">
+                <a16:creationId xmlns:a16="http://schemas.microsoft.com/office/drawing/2014/main" id="{62452B2C-DF0F-41EC-961C-1CDDC319D02B}"/>
+              </a:ext>
+            </a:extLst>
+          </p:cNvPr>
+          <p:cNvSpPr>
+            <a:spLocks noGrp="1"/>
+          </p:cNvSpPr>
+          <p:nvPr>
+            <p:ph type="title"/>
+          </p:nvPr>
+        </p:nvSpPr>
+        <p:spPr/>
+        <p:txBody>
+          <a:bodyPr>
+            <a:normAutofit/>
+          </a:bodyPr>
+          <a:lstStyle/>
+          <a:p>
+            <a:r>
+              <a:rPr lang="en-GB" sz="4000" dirty="0"/>
+              <a:t>Costs of MTD actions</a:t>
+            </a:r>
+          </a:p>
+        </p:txBody>
+      </p:sp>
+      <p:sp>
+        <p:nvSpPr>
+          <p:cNvPr id="4" name="Inhaltsplatzhalter 2">
+            <a:extLst>
+              <a:ext uri="{FF2B5EF4-FFF2-40B4-BE49-F238E27FC236}">
+                <a16:creationId xmlns:a16="http://schemas.microsoft.com/office/drawing/2014/main" id="{217765A3-09C5-4F51-B0B8-2C08C5FE4BA2}"/>
+              </a:ext>
+            </a:extLst>
+          </p:cNvPr>
+          <p:cNvSpPr>
+            <a:spLocks noGrp="1"/>
+          </p:cNvSpPr>
+          <p:nvPr>
+            <p:ph idx="1"/>
+          </p:nvPr>
+        </p:nvSpPr>
+        <p:spPr>
+          <a:xfrm>
+            <a:off x="838200" y="1825625"/>
+            <a:ext cx="10515600" cy="4351338"/>
+          </a:xfrm>
+        </p:spPr>
+        <p:txBody>
+          <a:bodyPr>
+            <a:normAutofit/>
+          </a:bodyPr>
+          <a:lstStyle/>
+          <a:p>
+            <a:pPr>
+              <a:buFont typeface="Courier New" panose="02070309020205020404" pitchFamily="49" charset="0"/>
+              <a:buChar char="o"/>
+            </a:pPr>
+            <a:r>
+              <a:rPr lang="en-GB" sz="1400" dirty="0"/>
+              <a:t>Restart / Swap Authorizer: 	5</a:t>
+            </a:r>
+          </a:p>
+          <a:p>
+            <a:pPr>
+              <a:buFont typeface="Courier New" panose="02070309020205020404" pitchFamily="49" charset="0"/>
+              <a:buChar char="o"/>
+            </a:pPr>
+            <a:r>
+              <a:rPr lang="en-GB" sz="1400" dirty="0"/>
+              <a:t>Restart / Swap Planner: 	5</a:t>
+            </a:r>
+          </a:p>
+          <a:p>
+            <a:pPr>
+              <a:buFont typeface="Courier New" panose="02070309020205020404" pitchFamily="49" charset="0"/>
+              <a:buChar char="o"/>
+            </a:pPr>
+            <a:r>
+              <a:rPr lang="en-GB" sz="1400" dirty="0"/>
+              <a:t>Restart / Swap DB: 		5</a:t>
+            </a:r>
+          </a:p>
+          <a:p>
+            <a:pPr>
+              <a:buFont typeface="Courier New" panose="02070309020205020404" pitchFamily="49" charset="0"/>
+              <a:buChar char="o"/>
+            </a:pPr>
+            <a:endParaRPr lang="en-GB" sz="1400" dirty="0"/>
+          </a:p>
+          <a:p>
+            <a:pPr>
+              <a:buFont typeface="Courier New" panose="02070309020205020404" pitchFamily="49" charset="0"/>
+              <a:buChar char="o"/>
+            </a:pPr>
+            <a:r>
+              <a:rPr lang="en-GB" sz="1400" dirty="0"/>
+              <a:t>Swap IDS:	2</a:t>
+            </a:r>
+          </a:p>
+          <a:p>
+            <a:pPr>
+              <a:buFont typeface="Courier New" panose="02070309020205020404" pitchFamily="49" charset="0"/>
+              <a:buChar char="o"/>
+            </a:pPr>
+            <a:r>
+              <a:rPr lang="en-GB" sz="1400" dirty="0"/>
+              <a:t>Swap PS:		2</a:t>
+            </a:r>
+          </a:p>
+          <a:p>
+            <a:pPr>
+              <a:buFont typeface="Courier New" panose="02070309020205020404" pitchFamily="49" charset="0"/>
+              <a:buChar char="o"/>
+            </a:pPr>
+            <a:endParaRPr lang="en-GB" sz="1400" dirty="0"/>
+          </a:p>
+          <a:p>
+            <a:pPr>
+              <a:buFont typeface="Courier New" panose="02070309020205020404" pitchFamily="49" charset="0"/>
+              <a:buChar char="o"/>
+            </a:pPr>
+            <a:r>
+              <a:rPr lang="en-GB" sz="1400" dirty="0"/>
+              <a:t>Honeypots logging &amp; learning:	0.1</a:t>
+            </a:r>
+          </a:p>
+          <a:p>
+            <a:pPr>
+              <a:buFont typeface="Courier New" panose="02070309020205020404" pitchFamily="49" charset="0"/>
+              <a:buChar char="o"/>
+            </a:pPr>
+            <a:endParaRPr lang="en-GB" sz="1400" dirty="0"/>
+          </a:p>
+          <a:p>
+            <a:pPr>
+              <a:buFont typeface="Courier New" panose="02070309020205020404" pitchFamily="49" charset="0"/>
+              <a:buChar char="o"/>
+            </a:pPr>
+            <a:r>
+              <a:rPr lang="en-GB" sz="1400" dirty="0"/>
+              <a:t>max costs or cost function:	7 per timestep, max 15 per </a:t>
+            </a:r>
+            <a:r>
+              <a:rPr lang="en-GB" sz="1400"/>
+              <a:t>10 timesteps</a:t>
+            </a:r>
+            <a:endParaRPr lang="en-GB" sz="1400" dirty="0"/>
+          </a:p>
+          <a:p>
+            <a:pPr>
+              <a:buFont typeface="Courier New" panose="02070309020205020404" pitchFamily="49" charset="0"/>
+              <a:buChar char="o"/>
+            </a:pPr>
+            <a:endParaRPr lang="en-GB" sz="1400" dirty="0"/>
+          </a:p>
+          <a:p>
+            <a:pPr>
+              <a:buFont typeface="Courier New" panose="02070309020205020404" pitchFamily="49" charset="0"/>
+              <a:buChar char="o"/>
+            </a:pPr>
+            <a:r>
+              <a:rPr lang="en-GB" sz="1400" dirty="0"/>
+              <a:t>attacker wins:		-1000</a:t>
+            </a:r>
+          </a:p>
+          <a:p>
+            <a:pPr>
+              <a:buFont typeface="Courier New" panose="02070309020205020404" pitchFamily="49" charset="0"/>
+              <a:buChar char="o"/>
+            </a:pPr>
+            <a:endParaRPr lang="en-GB" sz="1400" dirty="0"/>
+          </a:p>
+        </p:txBody>
+      </p:sp>
+    </p:spTree>
+    <p:extLst>
+      <p:ext uri="{BB962C8B-B14F-4D97-AF65-F5344CB8AC3E}">
+        <p14:creationId xmlns:p14="http://schemas.microsoft.com/office/powerpoint/2010/main" val="1384558664"/>
+      </p:ext>
+    </p:extLst>
+  </p:cSld>
+  <p:clrMapOvr>
+    <a:masterClrMapping/>
+  </p:clrMapOvr>
+</p:sld>
+</file>
+
+<file path=ppt/slides/slide11.xml><?xml version="1.0" encoding="utf-8"?>
+<p:sld xmlns:a="http://schemas.openxmlformats.org/drawingml/2006/main" xmlns:r="http://schemas.openxmlformats.org/officeDocument/2006/relationships" xmlns:p="http://schemas.openxmlformats.org/presentationml/2006/main">
+  <p:cSld>
+    <p:spTree>
+      <p:nvGrpSpPr>
+        <p:cNvPr id="1" name=""/>
+        <p:cNvGrpSpPr/>
+        <p:nvPr/>
+      </p:nvGrpSpPr>
+      <p:grpSpPr>
+        <a:xfrm>
+          <a:off x="0" y="0"/>
+          <a:ext cx="0" cy="0"/>
+          <a:chOff x="0" y="0"/>
+          <a:chExt cx="0" cy="0"/>
+        </a:xfrm>
+      </p:grpSpPr>
+      <p:sp>
+        <p:nvSpPr>
+          <p:cNvPr id="2" name="Title 1">
+            <a:extLst>
+              <a:ext uri="{FF2B5EF4-FFF2-40B4-BE49-F238E27FC236}">
                 <a16:creationId xmlns:a16="http://schemas.microsoft.com/office/drawing/2014/main" id="{3060C146-5A6D-4B28-A5A0-9A920D32AFB9}"/>
               </a:ext>
             </a:extLst>
@@ -3113,7 +3323,7 @@
 </p:sld>
 </file>
 
-<file path=ppt/slides/slide11.xml><?xml version="1.0" encoding="utf-8"?>
+<file path=ppt/slides/slide12.xml><?xml version="1.0" encoding="utf-8"?>
 <p:sld xmlns:a="http://schemas.openxmlformats.org/drawingml/2006/main" xmlns:r="http://schemas.openxmlformats.org/officeDocument/2006/relationships" xmlns:p="http://schemas.openxmlformats.org/presentationml/2006/main">
   <p:cSld>
     <p:spTree>
@@ -9898,7 +10108,7 @@
           <a:p>
             <a:r>
               <a:rPr lang="en-GB" sz="4000" dirty="0"/>
-              <a:t>RL Agent -&gt; Results</a:t>
+              <a:t>Simulation Actions -&gt; Model Actions:</a:t>
             </a:r>
           </a:p>
         </p:txBody>
@@ -9932,43 +10142,7 @@
             </a:pPr>
             <a:r>
               <a:rPr lang="en-GB" sz="1400" dirty="0"/>
-              <a:t>Restart / Swap Authorizer: 	kick attacker out of authorizer, set pa to pa 0</a:t>
-            </a:r>
-          </a:p>
-          <a:p>
-            <a:pPr>
-              <a:buFont typeface="Courier New" panose="02070309020205020404" pitchFamily="49" charset="0"/>
-              <a:buChar char="o"/>
-            </a:pPr>
-            <a:r>
-              <a:rPr lang="en-GB" sz="1400" dirty="0"/>
-              <a:t>Restart / Swap Planner: 	kick attacker out of planner, set pp to pp 0</a:t>
-            </a:r>
-          </a:p>
-          <a:p>
-            <a:pPr>
-              <a:buFont typeface="Courier New" panose="02070309020205020404" pitchFamily="49" charset="0"/>
-              <a:buChar char="o"/>
-            </a:pPr>
-            <a:r>
-              <a:rPr lang="en-GB" sz="1400" dirty="0"/>
-              <a:t>Restart / Swap DB: 		kick attacker out of DB, set </a:t>
-            </a:r>
-            <a:r>
-              <a:rPr lang="en-GB" sz="1400" dirty="0" err="1"/>
-              <a:t>pdb</a:t>
-            </a:r>
-            <a:r>
-              <a:rPr lang="en-GB" sz="1400" dirty="0"/>
-              <a:t> to </a:t>
-            </a:r>
-            <a:r>
-              <a:rPr lang="en-GB" sz="1400" dirty="0" err="1"/>
-              <a:t>pdb</a:t>
-            </a:r>
-            <a:r>
-              <a:rPr lang="en-GB" sz="1400" dirty="0"/>
-              <a:t> 0</a:t>
+              <a:t>Attacker gets into node:	set prob to 1 for next time (node is compromised until restarted)</a:t>
             </a:r>
           </a:p>
           <a:p>
@@ -9985,23 +10159,7 @@
             </a:pPr>
             <a:r>
               <a:rPr lang="en-GB" sz="1400" dirty="0"/>
-              <a:t>Swap IPS:	reset </a:t>
-            </a:r>
-            <a:r>
-              <a:rPr lang="en-GB" sz="1400" dirty="0" err="1"/>
-              <a:t>pIDS</a:t>
-            </a:r>
-            <a:r>
-              <a:rPr lang="en-GB" sz="1400" dirty="0"/>
-              <a:t> to </a:t>
-            </a:r>
-            <a:r>
-              <a:rPr lang="en-GB" sz="1400" dirty="0" err="1"/>
-              <a:t>pIDS</a:t>
-            </a:r>
-            <a:r>
-              <a:rPr lang="en-GB" sz="1400" dirty="0"/>
-              <a:t> 0</a:t>
+              <a:t>Restart node:		set current probability of attacker getting in to initial prob</a:t>
             </a:r>
           </a:p>
           <a:p>
@@ -10011,23 +10169,15 @@
             </a:pPr>
             <a:r>
               <a:rPr lang="en-GB" sz="1400" dirty="0"/>
-              <a:t>Swap PS:		reset </a:t>
-            </a:r>
-            <a:r>
-              <a:rPr lang="en-GB" sz="1400" dirty="0" err="1"/>
-              <a:t>pPS</a:t>
+              <a:t>Switch detection system:	 set current probability of catching </a:t>
+            </a:r>
+            <a:r>
+              <a:rPr lang="en-GB" sz="1400"/>
+              <a:t>attacker to </a:t>
             </a:r>
             <a:r>
               <a:rPr lang="en-GB" sz="1400" dirty="0"/>
-              <a:t> to </a:t>
-            </a:r>
-            <a:r>
-              <a:rPr lang="en-GB" sz="1400" dirty="0" err="1"/>
-              <a:t>pPS</a:t>
-            </a:r>
-            <a:r>
-              <a:rPr lang="en-GB" sz="1400" dirty="0"/>
-              <a:t> 0</a:t>
+              <a:t>initial prob</a:t>
             </a:r>
           </a:p>
           <a:p>
@@ -10037,73 +10187,12 @@
             </a:pPr>
             <a:endParaRPr lang="en-GB" sz="1400" dirty="0"/>
           </a:p>
-          <a:p>
-            <a:pPr>
-              <a:buFont typeface="Courier New" panose="02070309020205020404" pitchFamily="49" charset="0"/>
-              <a:buChar char="o"/>
-            </a:pPr>
-            <a:r>
-              <a:rPr lang="en-GB" sz="1400" dirty="0"/>
-              <a:t>Catch Attacker: 	kick attacker out of System</a:t>
-            </a:r>
-          </a:p>
-          <a:p>
-            <a:pPr>
-              <a:buFont typeface="Courier New" panose="02070309020205020404" pitchFamily="49" charset="0"/>
-              <a:buChar char="o"/>
-            </a:pPr>
-            <a:endParaRPr lang="en-GB" sz="1400" dirty="0"/>
-          </a:p>
-          <a:p>
-            <a:pPr>
-              <a:buFont typeface="Courier New" panose="02070309020205020404" pitchFamily="49" charset="0"/>
-              <a:buChar char="o"/>
-            </a:pPr>
-            <a:r>
-              <a:rPr lang="en-GB" sz="1400" dirty="0"/>
-              <a:t>Data extracted:			Attacker wins</a:t>
-            </a:r>
-          </a:p>
-          <a:p>
-            <a:pPr>
-              <a:buFont typeface="Courier New" panose="02070309020205020404" pitchFamily="49" charset="0"/>
-              <a:buChar char="o"/>
-            </a:pPr>
-            <a:r>
-              <a:rPr lang="en-GB" sz="1400" dirty="0"/>
-              <a:t>x time steps passed w/out extraction:	MTD wins</a:t>
-            </a:r>
-          </a:p>
-          <a:p>
-            <a:pPr>
-              <a:buFont typeface="Courier New" panose="02070309020205020404" pitchFamily="49" charset="0"/>
-              <a:buChar char="o"/>
-            </a:pPr>
-            <a:endParaRPr lang="en-GB" sz="1400" dirty="0"/>
-          </a:p>
-          <a:p>
-            <a:pPr>
-              <a:buFont typeface="Courier New" panose="02070309020205020404" pitchFamily="49" charset="0"/>
-              <a:buChar char="o"/>
-            </a:pPr>
-            <a:r>
-              <a:rPr lang="en-GB" sz="1400" dirty="0"/>
-              <a:t>all probabilities change over time (x attacks per timestep)</a:t>
-            </a:r>
-          </a:p>
-          <a:p>
-            <a:pPr>
-              <a:buFont typeface="Courier New" panose="02070309020205020404" pitchFamily="49" charset="0"/>
-              <a:buChar char="o"/>
-            </a:pPr>
-            <a:endParaRPr lang="en-GB" sz="1400" dirty="0"/>
-          </a:p>
         </p:txBody>
       </p:sp>
     </p:spTree>
     <p:extLst>
       <p:ext uri="{BB962C8B-B14F-4D97-AF65-F5344CB8AC3E}">
-        <p14:creationId xmlns:p14="http://schemas.microsoft.com/office/powerpoint/2010/main" val="4044897784"/>
+        <p14:creationId xmlns:p14="http://schemas.microsoft.com/office/powerpoint/2010/main" val="2978433323"/>
       </p:ext>
     </p:extLst>
   </p:cSld>
@@ -10146,12 +10235,7 @@
             <p:ph type="title"/>
           </p:nvPr>
         </p:nvSpPr>
-        <p:spPr>
-          <a:xfrm>
-            <a:off x="838200" y="365125"/>
-            <a:ext cx="10515600" cy="1764121"/>
-          </a:xfrm>
-        </p:spPr>
+        <p:spPr/>
         <p:txBody>
           <a:bodyPr>
             <a:normAutofit/>
@@ -10160,62 +10244,8 @@
           <a:p>
             <a:r>
               <a:rPr lang="en-GB" sz="4000" dirty="0"/>
-              <a:t>p</a:t>
-            </a:r>
-            <a:r>
-              <a:rPr lang="en-GB" sz="1800" dirty="0"/>
-              <a:t>x </a:t>
-            </a:r>
-            <a:r>
-              <a:rPr lang="en-GB" sz="4000" dirty="0"/>
-              <a:t> - Probability of event x at time t</a:t>
-            </a:r>
-            <a:br>
-              <a:rPr lang="en-GB" sz="4000" dirty="0"/>
-            </a:br>
-            <a:br>
-              <a:rPr lang="en-GB" sz="1400" dirty="0"/>
-            </a:br>
-            <a:r>
-              <a:rPr lang="en-GB" sz="2800" dirty="0"/>
-              <a:t>p</a:t>
-            </a:r>
-            <a:r>
-              <a:rPr lang="en-GB" sz="1400" dirty="0"/>
-              <a:t>x0</a:t>
-            </a:r>
-            <a:r>
-              <a:rPr lang="en-GB" sz="2800" dirty="0"/>
-              <a:t> – Probability of event x at time t = 0</a:t>
-            </a:r>
-            <a:br>
-              <a:rPr lang="en-GB" sz="2800" dirty="0"/>
-            </a:br>
-            <a:r>
-              <a:rPr lang="en-GB" sz="2700" dirty="0" err="1"/>
-              <a:t>d</a:t>
-            </a:r>
-            <a:r>
-              <a:rPr lang="en-GB" sz="2000" dirty="0" err="1"/>
-              <a:t>p</a:t>
-            </a:r>
-            <a:r>
-              <a:rPr lang="en-GB" sz="1200" dirty="0" err="1"/>
-              <a:t>x</a:t>
-            </a:r>
-            <a:r>
-              <a:rPr lang="en-GB" sz="2700" dirty="0"/>
-              <a:t>/dt</a:t>
-            </a:r>
-            <a:r>
-              <a:rPr lang="en-GB" sz="1200" dirty="0"/>
-              <a:t> </a:t>
-            </a:r>
-            <a:r>
-              <a:rPr lang="en-GB" sz="2700" dirty="0"/>
-              <a:t> - Change in Probability after time t</a:t>
-            </a:r>
-            <a:endParaRPr lang="en-GB" dirty="0"/>
+              <a:t>RL Agent Actions -&gt; Model Actions:</a:t>
+            </a:r>
           </a:p>
         </p:txBody>
       </p:sp>
@@ -10235,15 +10265,10 @@
             <p:ph idx="1"/>
           </p:nvPr>
         </p:nvSpPr>
-        <p:spPr>
-          <a:xfrm>
-            <a:off x="838200" y="2329543"/>
-            <a:ext cx="10515600" cy="3847420"/>
-          </a:xfrm>
-        </p:spPr>
+        <p:spPr/>
         <p:txBody>
           <a:bodyPr>
-            <a:normAutofit fontScale="92500" lnSpcReduction="20000"/>
+            <a:normAutofit/>
           </a:bodyPr>
           <a:lstStyle/>
           <a:p>
@@ -10253,7 +10278,7 @@
             </a:pPr>
             <a:r>
               <a:rPr lang="en-GB" sz="1400" dirty="0"/>
-              <a:t>pa: attacker gaining control of Authorizer</a:t>
+              <a:t>Restart / Swap Authorizer: 	kick attacker out of authorizer, set pa to pa 0</a:t>
             </a:r>
           </a:p>
           <a:p>
@@ -10263,7 +10288,7 @@
             </a:pPr>
             <a:r>
               <a:rPr lang="en-GB" sz="1400" dirty="0"/>
-              <a:t>pp: attacker gaining control of Planner</a:t>
+              <a:t>Restart / Swap Planner: 	kick attacker out of planner, set pp to pp 0</a:t>
             </a:r>
           </a:p>
           <a:p>
@@ -10273,27 +10298,23 @@
             </a:pPr>
             <a:r>
               <a:rPr lang="en-GB" sz="1400" dirty="0"/>
-              <a:t>pdb1:  attacker gaining control of DB1</a:t>
-            </a:r>
-          </a:p>
-          <a:p>
-            <a:pPr>
-              <a:buFont typeface="Courier New" panose="02070309020205020404" pitchFamily="49" charset="0"/>
-              <a:buChar char="o"/>
-            </a:pPr>
+              <a:t>Restart / Swap DB: 		kick attacker out of DB, set </a:t>
+            </a:r>
+            <a:r>
+              <a:rPr lang="en-GB" sz="1400" dirty="0" err="1"/>
+              <a:t>pdb</a:t>
+            </a:r>
             <a:r>
               <a:rPr lang="en-GB" sz="1400" dirty="0"/>
-              <a:t>pdb2:  attacker gaining control of DB2</a:t>
-            </a:r>
-          </a:p>
-          <a:p>
-            <a:pPr>
-              <a:buFont typeface="Courier New" panose="02070309020205020404" pitchFamily="49" charset="0"/>
-              <a:buChar char="o"/>
-            </a:pPr>
+              <a:t> to </a:t>
+            </a:r>
+            <a:r>
+              <a:rPr lang="en-GB" sz="1400" dirty="0" err="1"/>
+              <a:t>pdb</a:t>
+            </a:r>
             <a:r>
               <a:rPr lang="en-GB" sz="1400" dirty="0"/>
-              <a:t>pdb3:  attacker gaining control of DB3</a:t>
+              <a:t> 0</a:t>
             </a:r>
           </a:p>
           <a:p>
@@ -10309,12 +10330,24 @@
               <a:buChar char="o"/>
             </a:pPr>
             <a:r>
+              <a:rPr lang="en-GB" sz="1400" dirty="0"/>
+              <a:t>Swap IPS:	reset </a:t>
+            </a:r>
+            <a:r>
               <a:rPr lang="en-GB" sz="1400" dirty="0" err="1"/>
-              <a:t>pah</a:t>
+              <a:t>pIDS</a:t>
             </a:r>
             <a:r>
               <a:rPr lang="en-GB" sz="1400" dirty="0"/>
-              <a:t>: attacker getting into Honeypot from authorizer</a:t>
+              <a:t> to </a:t>
+            </a:r>
+            <a:r>
+              <a:rPr lang="en-GB" sz="1400" dirty="0" err="1"/>
+              <a:t>pIDS</a:t>
+            </a:r>
+            <a:r>
+              <a:rPr lang="en-GB" sz="1400" dirty="0"/>
+              <a:t> 0</a:t>
             </a:r>
           </a:p>
           <a:p>
@@ -10323,36 +10356,24 @@
               <a:buChar char="o"/>
             </a:pPr>
             <a:r>
+              <a:rPr lang="en-GB" sz="1400" dirty="0"/>
+              <a:t>Swap PS:		reset </a:t>
+            </a:r>
+            <a:r>
               <a:rPr lang="en-GB" sz="1400" dirty="0" err="1"/>
-              <a:t>pha</a:t>
+              <a:t>pPS</a:t>
             </a:r>
             <a:r>
               <a:rPr lang="en-GB" sz="1400" dirty="0"/>
-              <a:t>: attacker getting from Honeypot back to authorizer</a:t>
-            </a:r>
-          </a:p>
-          <a:p>
-            <a:pPr>
-              <a:buFont typeface="Courier New" panose="02070309020205020404" pitchFamily="49" charset="0"/>
-              <a:buChar char="o"/>
-            </a:pPr>
+              <a:t> to </a:t>
+            </a:r>
             <a:r>
               <a:rPr lang="en-GB" sz="1400" dirty="0" err="1"/>
-              <a:t>pph</a:t>
+              <a:t>pPS</a:t>
             </a:r>
             <a:r>
               <a:rPr lang="en-GB" sz="1400" dirty="0"/>
-              <a:t>: attacker getting into Honeypot from planer</a:t>
-            </a:r>
-          </a:p>
-          <a:p>
-            <a:pPr>
-              <a:buFont typeface="Courier New" panose="02070309020205020404" pitchFamily="49" charset="0"/>
-              <a:buChar char="o"/>
-            </a:pPr>
-            <a:r>
-              <a:rPr lang="en-GB" sz="1400" dirty="0"/>
-              <a:t>php: attacker getting from Honeypot back to planner</a:t>
+              <a:t> 0</a:t>
             </a:r>
           </a:p>
           <a:p>
@@ -10369,23 +10390,7 @@
             </a:pPr>
             <a:r>
               <a:rPr lang="en-GB" sz="1400" dirty="0"/>
-              <a:t>pIDS1: Intrusion Detection System 1 detecting attacker before Authorizer, Planner or DB</a:t>
-            </a:r>
-          </a:p>
-          <a:p>
-            <a:pPr marL="0" indent="0">
-              <a:buNone/>
-            </a:pPr>
-            <a:endParaRPr lang="en-GB" sz="1400" dirty="0"/>
-          </a:p>
-          <a:p>
-            <a:pPr>
-              <a:buFont typeface="Courier New" panose="02070309020205020404" pitchFamily="49" charset="0"/>
-              <a:buChar char="o"/>
-            </a:pPr>
-            <a:r>
-              <a:rPr lang="en-GB" sz="1400" dirty="0"/>
-              <a:t>pPS1: Prevention System 1 detecting attacker before extracting data</a:t>
+              <a:t>Catch Attacker: 	kick attacker out of System</a:t>
             </a:r>
           </a:p>
           <a:p>
@@ -10395,12 +10400,56 @@
             </a:pPr>
             <a:endParaRPr lang="en-GB" sz="1400" dirty="0"/>
           </a:p>
+          <a:p>
+            <a:pPr>
+              <a:buFont typeface="Courier New" panose="02070309020205020404" pitchFamily="49" charset="0"/>
+              <a:buChar char="o"/>
+            </a:pPr>
+            <a:r>
+              <a:rPr lang="en-GB" sz="1400" dirty="0"/>
+              <a:t>Data extracted:			Attacker wins</a:t>
+            </a:r>
+          </a:p>
+          <a:p>
+            <a:pPr>
+              <a:buFont typeface="Courier New" panose="02070309020205020404" pitchFamily="49" charset="0"/>
+              <a:buChar char="o"/>
+            </a:pPr>
+            <a:r>
+              <a:rPr lang="en-GB" sz="1400" dirty="0"/>
+              <a:t>x time steps passed w/out extraction:	MTD wins</a:t>
+            </a:r>
+          </a:p>
+          <a:p>
+            <a:pPr>
+              <a:buFont typeface="Courier New" panose="02070309020205020404" pitchFamily="49" charset="0"/>
+              <a:buChar char="o"/>
+            </a:pPr>
+            <a:endParaRPr lang="en-GB" sz="1400" dirty="0"/>
+          </a:p>
+          <a:p>
+            <a:pPr>
+              <a:buFont typeface="Courier New" panose="02070309020205020404" pitchFamily="49" charset="0"/>
+              <a:buChar char="o"/>
+            </a:pPr>
+            <a:r>
+              <a:rPr lang="en-GB" sz="1400" dirty="0"/>
+              <a:t>all probabilities change over time (x attacks per timestep)</a:t>
+            </a:r>
+          </a:p>
+          <a:p>
+            <a:pPr>
+              <a:buFont typeface="Courier New" panose="02070309020205020404" pitchFamily="49" charset="0"/>
+              <a:buChar char="o"/>
+            </a:pPr>
+            <a:endParaRPr lang="en-GB" sz="1400" dirty="0"/>
+          </a:p>
         </p:txBody>
       </p:sp>
     </p:spTree>
     <p:extLst>
       <p:ext uri="{BB962C8B-B14F-4D97-AF65-F5344CB8AC3E}">
-        <p14:creationId xmlns:p14="http://schemas.microsoft.com/office/powerpoint/2010/main" val="3797663175"/>
+        <p14:creationId xmlns:p14="http://schemas.microsoft.com/office/powerpoint/2010/main" val="4136226465"/>
       </p:ext>
     </p:extLst>
   </p:cSld>
@@ -10429,10 +10478,10 @@
       </p:grpSpPr>
       <p:sp>
         <p:nvSpPr>
-          <p:cNvPr id="2" name="Title 1">
-            <a:extLst>
-              <a:ext uri="{FF2B5EF4-FFF2-40B4-BE49-F238E27FC236}">
-                <a16:creationId xmlns:a16="http://schemas.microsoft.com/office/drawing/2014/main" id="{62452B2C-DF0F-41EC-961C-1CDDC319D02B}"/>
+          <p:cNvPr id="2" name="Titel 1">
+            <a:extLst>
+              <a:ext uri="{FF2B5EF4-FFF2-40B4-BE49-F238E27FC236}">
+                <a16:creationId xmlns:a16="http://schemas.microsoft.com/office/drawing/2014/main" id="{1A195801-25AE-42BD-BC00-72346510CE73}"/>
               </a:ext>
             </a:extLst>
           </p:cNvPr>
@@ -10443,7 +10492,12 @@
             <p:ph type="title"/>
           </p:nvPr>
         </p:nvSpPr>
-        <p:spPr/>
+        <p:spPr>
+          <a:xfrm>
+            <a:off x="838200" y="365125"/>
+            <a:ext cx="10515600" cy="1764121"/>
+          </a:xfrm>
+        </p:spPr>
         <p:txBody>
           <a:bodyPr>
             <a:normAutofit/>
@@ -10452,17 +10506,71 @@
           <a:p>
             <a:r>
               <a:rPr lang="en-GB" sz="4000" dirty="0"/>
-              <a:t>Costs of MTD actions</a:t>
-            </a:r>
-          </a:p>
-        </p:txBody>
-      </p:sp>
-      <p:sp>
-        <p:nvSpPr>
-          <p:cNvPr id="4" name="Inhaltsplatzhalter 2">
-            <a:extLst>
-              <a:ext uri="{FF2B5EF4-FFF2-40B4-BE49-F238E27FC236}">
-                <a16:creationId xmlns:a16="http://schemas.microsoft.com/office/drawing/2014/main" id="{217765A3-09C5-4F51-B0B8-2C08C5FE4BA2}"/>
+              <a:t>p</a:t>
+            </a:r>
+            <a:r>
+              <a:rPr lang="en-GB" sz="1800" dirty="0"/>
+              <a:t>x </a:t>
+            </a:r>
+            <a:r>
+              <a:rPr lang="en-GB" sz="4000" dirty="0"/>
+              <a:t> - Probability of event x at time t</a:t>
+            </a:r>
+            <a:br>
+              <a:rPr lang="en-GB" sz="4000" dirty="0"/>
+            </a:br>
+            <a:br>
+              <a:rPr lang="en-GB" sz="1400" dirty="0"/>
+            </a:br>
+            <a:r>
+              <a:rPr lang="en-GB" sz="2800" dirty="0"/>
+              <a:t>p</a:t>
+            </a:r>
+            <a:r>
+              <a:rPr lang="en-GB" sz="1400" dirty="0"/>
+              <a:t>x0</a:t>
+            </a:r>
+            <a:r>
+              <a:rPr lang="en-GB" sz="2800" dirty="0"/>
+              <a:t> – Probability of event x at time t = 0</a:t>
+            </a:r>
+            <a:br>
+              <a:rPr lang="en-GB" sz="2800" dirty="0"/>
+            </a:br>
+            <a:r>
+              <a:rPr lang="en-GB" sz="2700" dirty="0" err="1"/>
+              <a:t>d</a:t>
+            </a:r>
+            <a:r>
+              <a:rPr lang="en-GB" sz="2000" dirty="0" err="1"/>
+              <a:t>p</a:t>
+            </a:r>
+            <a:r>
+              <a:rPr lang="en-GB" sz="1200" dirty="0" err="1"/>
+              <a:t>x</a:t>
+            </a:r>
+            <a:r>
+              <a:rPr lang="en-GB" sz="2700" dirty="0"/>
+              <a:t>/dt</a:t>
+            </a:r>
+            <a:r>
+              <a:rPr lang="en-GB" sz="1200" dirty="0"/>
+              <a:t> </a:t>
+            </a:r>
+            <a:r>
+              <a:rPr lang="en-GB" sz="2700" dirty="0"/>
+              <a:t> - Change in Probability after time t</a:t>
+            </a:r>
+            <a:endParaRPr lang="en-GB" dirty="0"/>
+          </a:p>
+        </p:txBody>
+      </p:sp>
+      <p:sp>
+        <p:nvSpPr>
+          <p:cNvPr id="3" name="Inhaltsplatzhalter 2">
+            <a:extLst>
+              <a:ext uri="{FF2B5EF4-FFF2-40B4-BE49-F238E27FC236}">
+                <a16:creationId xmlns:a16="http://schemas.microsoft.com/office/drawing/2014/main" id="{62BBC4CF-AEEA-4CBC-86F6-DA80B8B3D155}"/>
               </a:ext>
             </a:extLst>
           </p:cNvPr>
@@ -10475,13 +10583,13 @@
         </p:nvSpPr>
         <p:spPr>
           <a:xfrm>
-            <a:off x="838200" y="1825625"/>
-            <a:ext cx="10515600" cy="4351338"/>
+            <a:off x="838200" y="2329543"/>
+            <a:ext cx="10515600" cy="3847420"/>
           </a:xfrm>
         </p:spPr>
         <p:txBody>
           <a:bodyPr>
-            <a:normAutofit/>
+            <a:normAutofit fontScale="92500" lnSpcReduction="20000"/>
           </a:bodyPr>
           <a:lstStyle/>
           <a:p>
@@ -10491,7 +10599,7 @@
             </a:pPr>
             <a:r>
               <a:rPr lang="en-GB" sz="1400" dirty="0"/>
-              <a:t>Restart / Swap Authorizer: 	5</a:t>
+              <a:t>pa: attacker gaining control of Authorizer</a:t>
             </a:r>
           </a:p>
           <a:p>
@@ -10501,7 +10609,7 @@
             </a:pPr>
             <a:r>
               <a:rPr lang="en-GB" sz="1400" dirty="0"/>
-              <a:t>Restart / Swap Planner: 	5</a:t>
+              <a:t>pp: attacker gaining control of Planner</a:t>
             </a:r>
           </a:p>
           <a:p>
@@ -10511,7 +10619,27 @@
             </a:pPr>
             <a:r>
               <a:rPr lang="en-GB" sz="1400" dirty="0"/>
-              <a:t>Restart / Swap DB: 		5</a:t>
+              <a:t>pdb1:  attacker gaining control of DB1</a:t>
+            </a:r>
+          </a:p>
+          <a:p>
+            <a:pPr>
+              <a:buFont typeface="Courier New" panose="02070309020205020404" pitchFamily="49" charset="0"/>
+              <a:buChar char="o"/>
+            </a:pPr>
+            <a:r>
+              <a:rPr lang="en-GB" sz="1400" dirty="0"/>
+              <a:t>pdb2:  attacker gaining control of DB2</a:t>
+            </a:r>
+          </a:p>
+          <a:p>
+            <a:pPr>
+              <a:buFont typeface="Courier New" panose="02070309020205020404" pitchFamily="49" charset="0"/>
+              <a:buChar char="o"/>
+            </a:pPr>
+            <a:r>
+              <a:rPr lang="en-GB" sz="1400" dirty="0"/>
+              <a:t>pdb3:  attacker gaining control of DB3</a:t>
             </a:r>
           </a:p>
           <a:p>
@@ -10527,8 +10655,12 @@
               <a:buChar char="o"/>
             </a:pPr>
             <a:r>
+              <a:rPr lang="en-GB" sz="1400" dirty="0" err="1"/>
+              <a:t>pah</a:t>
+            </a:r>
+            <a:r>
               <a:rPr lang="en-GB" sz="1400" dirty="0"/>
-              <a:t>Swap IDS:	2</a:t>
+              <a:t>: attacker getting into Honeypot from authorizer</a:t>
             </a:r>
           </a:p>
           <a:p>
@@ -10537,8 +10669,36 @@
               <a:buChar char="o"/>
             </a:pPr>
             <a:r>
+              <a:rPr lang="en-GB" sz="1400" dirty="0" err="1"/>
+              <a:t>pha</a:t>
+            </a:r>
+            <a:r>
               <a:rPr lang="en-GB" sz="1400" dirty="0"/>
-              <a:t>Swap PS:		2</a:t>
+              <a:t>: attacker getting from Honeypot back to authorizer</a:t>
+            </a:r>
+          </a:p>
+          <a:p>
+            <a:pPr>
+              <a:buFont typeface="Courier New" panose="02070309020205020404" pitchFamily="49" charset="0"/>
+              <a:buChar char="o"/>
+            </a:pPr>
+            <a:r>
+              <a:rPr lang="en-GB" sz="1400" dirty="0" err="1"/>
+              <a:t>pph</a:t>
+            </a:r>
+            <a:r>
+              <a:rPr lang="en-GB" sz="1400" dirty="0"/>
+              <a:t>: attacker getting into Honeypot from planer</a:t>
+            </a:r>
+          </a:p>
+          <a:p>
+            <a:pPr>
+              <a:buFont typeface="Courier New" panose="02070309020205020404" pitchFamily="49" charset="0"/>
+              <a:buChar char="o"/>
+            </a:pPr>
+            <a:r>
+              <a:rPr lang="en-GB" sz="1400" dirty="0"/>
+              <a:t>php: attacker getting from Honeypot back to planner</a:t>
             </a:r>
           </a:p>
           <a:p>
@@ -10555,7 +10715,23 @@
             </a:pPr>
             <a:r>
               <a:rPr lang="en-GB" sz="1400" dirty="0"/>
-              <a:t>Honeypots logging &amp; learning:	0.1</a:t>
+              <a:t>pIDS1: Intrusion Detection System 1 detecting attacker before Authorizer, Planner or DB</a:t>
+            </a:r>
+          </a:p>
+          <a:p>
+            <a:pPr marL="0" indent="0">
+              <a:buNone/>
+            </a:pPr>
+            <a:endParaRPr lang="en-GB" sz="1400" dirty="0"/>
+          </a:p>
+          <a:p>
+            <a:pPr>
+              <a:buFont typeface="Courier New" panose="02070309020205020404" pitchFamily="49" charset="0"/>
+              <a:buChar char="o"/>
+            </a:pPr>
+            <a:r>
+              <a:rPr lang="en-GB" sz="1400" dirty="0"/>
+              <a:t>pPS1: Prevention System 1 detecting attacker before extracting data</a:t>
             </a:r>
           </a:p>
           <a:p>
@@ -10565,51 +10741,12 @@
             </a:pPr>
             <a:endParaRPr lang="en-GB" sz="1400" dirty="0"/>
           </a:p>
-          <a:p>
-            <a:pPr>
-              <a:buFont typeface="Courier New" panose="02070309020205020404" pitchFamily="49" charset="0"/>
-              <a:buChar char="o"/>
-            </a:pPr>
-            <a:r>
-              <a:rPr lang="en-GB" sz="1400" dirty="0"/>
-              <a:t>max costs or cost function:	7 per timestep, max 15 per </a:t>
-            </a:r>
-            <a:r>
-              <a:rPr lang="en-GB" sz="1400"/>
-              <a:t>10 timesteps</a:t>
-            </a:r>
-            <a:endParaRPr lang="en-GB" sz="1400" dirty="0"/>
-          </a:p>
-          <a:p>
-            <a:pPr>
-              <a:buFont typeface="Courier New" panose="02070309020205020404" pitchFamily="49" charset="0"/>
-              <a:buChar char="o"/>
-            </a:pPr>
-            <a:endParaRPr lang="en-GB" sz="1400" dirty="0"/>
-          </a:p>
-          <a:p>
-            <a:pPr>
-              <a:buFont typeface="Courier New" panose="02070309020205020404" pitchFamily="49" charset="0"/>
-              <a:buChar char="o"/>
-            </a:pPr>
-            <a:r>
-              <a:rPr lang="en-GB" sz="1400" dirty="0"/>
-              <a:t>attacker wins:		-1000</a:t>
-            </a:r>
-          </a:p>
-          <a:p>
-            <a:pPr>
-              <a:buFont typeface="Courier New" panose="02070309020205020404" pitchFamily="49" charset="0"/>
-              <a:buChar char="o"/>
-            </a:pPr>
-            <a:endParaRPr lang="en-GB" sz="1400" dirty="0"/>
-          </a:p>
         </p:txBody>
       </p:sp>
     </p:spTree>
     <p:extLst>
       <p:ext uri="{BB962C8B-B14F-4D97-AF65-F5344CB8AC3E}">
-        <p14:creationId xmlns:p14="http://schemas.microsoft.com/office/powerpoint/2010/main" val="1384558664"/>
+        <p14:creationId xmlns:p14="http://schemas.microsoft.com/office/powerpoint/2010/main" val="3797663175"/>
       </p:ext>
     </p:extLst>
   </p:cSld>
@@ -10881,12 +11018,9 @@
 </file>
 
 <file path=customXml/item1.xml><?xml version="1.0" encoding="utf-8"?>
-<?mso-contentType ?>
-<FormTemplates xmlns="http://schemas.microsoft.com/sharepoint/v3/contenttype/forms">
-  <Display>DocumentLibraryForm</Display>
-  <Edit>DocumentLibraryForm</Edit>
-  <New>DocumentLibraryForm</New>
-</FormTemplates>
+<p:properties xmlns:p="http://schemas.microsoft.com/office/2006/metadata/properties" xmlns:xsi="http://www.w3.org/2001/XMLSchema-instance" xmlns:pc="http://schemas.microsoft.com/office/infopath/2007/PartnerControls">
+  <documentManagement/>
+</p:properties>
 </file>
 
 <file path=customXml/item2.xml><?xml version="1.0" encoding="utf-8"?>
@@ -11036,15 +11170,26 @@
 </file>
 
 <file path=customXml/item3.xml><?xml version="1.0" encoding="utf-8"?>
-<p:properties xmlns:p="http://schemas.microsoft.com/office/2006/metadata/properties" xmlns:xsi="http://www.w3.org/2001/XMLSchema-instance" xmlns:pc="http://schemas.microsoft.com/office/infopath/2007/PartnerControls">
-  <documentManagement/>
-</p:properties>
+<?mso-contentType ?>
+<FormTemplates xmlns="http://schemas.microsoft.com/sharepoint/v3/contenttype/forms">
+  <Display>DocumentLibraryForm</Display>
+  <Edit>DocumentLibraryForm</Edit>
+  <New>DocumentLibraryForm</New>
+</FormTemplates>
 </file>
 
 <file path=customXml/itemProps1.xml><?xml version="1.0" encoding="utf-8"?>
-<ds:datastoreItem xmlns:ds="http://schemas.openxmlformats.org/officeDocument/2006/customXml" ds:itemID="{4E70509A-51F1-449D-A20D-C92EB9A4F9DF}">
+<ds:datastoreItem xmlns:ds="http://schemas.openxmlformats.org/officeDocument/2006/customXml" ds:itemID="{B111369F-841E-4499-8860-ACB5045CEC00}">
   <ds:schemaRefs>
-    <ds:schemaRef ds:uri="http://schemas.microsoft.com/sharepoint/v3/contenttype/forms"/>
+    <ds:schemaRef ds:uri="http://schemas.microsoft.com/office/2006/metadata/properties"/>
+    <ds:schemaRef ds:uri="http://www.w3.org/XML/1998/namespace"/>
+    <ds:schemaRef ds:uri="0ca4519e-f7ae-4716-9300-8b80674a5553"/>
+    <ds:schemaRef ds:uri="http://schemas.openxmlformats.org/package/2006/metadata/core-properties"/>
+    <ds:schemaRef ds:uri="http://schemas.microsoft.com/office/infopath/2007/PartnerControls"/>
+    <ds:schemaRef ds:uri="http://schemas.microsoft.com/office/2006/documentManagement/types"/>
+    <ds:schemaRef ds:uri="http://purl.org/dc/dcmitype/"/>
+    <ds:schemaRef ds:uri="http://purl.org/dc/terms/"/>
+    <ds:schemaRef ds:uri="http://purl.org/dc/elements/1.1/"/>
   </ds:schemaRefs>
 </ds:datastoreItem>
 </file>
@@ -11068,17 +11213,9 @@
 </file>
 
 <file path=customXml/itemProps3.xml><?xml version="1.0" encoding="utf-8"?>
-<ds:datastoreItem xmlns:ds="http://schemas.openxmlformats.org/officeDocument/2006/customXml" ds:itemID="{B111369F-841E-4499-8860-ACB5045CEC00}">
+<ds:datastoreItem xmlns:ds="http://schemas.openxmlformats.org/officeDocument/2006/customXml" ds:itemID="{4E70509A-51F1-449D-A20D-C92EB9A4F9DF}">
   <ds:schemaRefs>
-    <ds:schemaRef ds:uri="http://schemas.microsoft.com/office/2006/metadata/properties"/>
-    <ds:schemaRef ds:uri="http://www.w3.org/XML/1998/namespace"/>
-    <ds:schemaRef ds:uri="0ca4519e-f7ae-4716-9300-8b80674a5553"/>
-    <ds:schemaRef ds:uri="http://schemas.openxmlformats.org/package/2006/metadata/core-properties"/>
-    <ds:schemaRef ds:uri="http://schemas.microsoft.com/office/infopath/2007/PartnerControls"/>
-    <ds:schemaRef ds:uri="http://schemas.microsoft.com/office/2006/documentManagement/types"/>
-    <ds:schemaRef ds:uri="http://purl.org/dc/dcmitype/"/>
-    <ds:schemaRef ds:uri="http://purl.org/dc/terms/"/>
-    <ds:schemaRef ds:uri="http://purl.org/dc/elements/1.1/"/>
+    <ds:schemaRef ds:uri="http://schemas.microsoft.com/sharepoint/v3/contenttype/forms"/>
   </ds:schemaRefs>
 </ds:datastoreItem>
 </file>
</xml_diff>

<commit_message>
small fix in model.pptx
</commit_message>
<xml_diff>
--- a/Model.pptx
+++ b/Model.pptx
@@ -252,7 +252,7 @@
           <a:p>
             <a:fld id="{D3EB3054-B75A-4BD7-8B3E-8DC0F614FAF3}" type="datetimeFigureOut">
               <a:rPr lang="de-DE" smtClean="0"/>
-              <a:t>16.11.2020</a:t>
+              <a:t>17.11.2020</a:t>
             </a:fld>
             <a:endParaRPr lang="de-DE"/>
           </a:p>
@@ -420,7 +420,7 @@
           <a:p>
             <a:fld id="{D3EB3054-B75A-4BD7-8B3E-8DC0F614FAF3}" type="datetimeFigureOut">
               <a:rPr lang="de-DE" smtClean="0"/>
-              <a:t>16.11.2020</a:t>
+              <a:t>17.11.2020</a:t>
             </a:fld>
             <a:endParaRPr lang="de-DE"/>
           </a:p>
@@ -598,7 +598,7 @@
           <a:p>
             <a:fld id="{D3EB3054-B75A-4BD7-8B3E-8DC0F614FAF3}" type="datetimeFigureOut">
               <a:rPr lang="de-DE" smtClean="0"/>
-              <a:t>16.11.2020</a:t>
+              <a:t>17.11.2020</a:t>
             </a:fld>
             <a:endParaRPr lang="de-DE"/>
           </a:p>
@@ -766,7 +766,7 @@
           <a:p>
             <a:fld id="{D3EB3054-B75A-4BD7-8B3E-8DC0F614FAF3}" type="datetimeFigureOut">
               <a:rPr lang="de-DE" smtClean="0"/>
-              <a:t>16.11.2020</a:t>
+              <a:t>17.11.2020</a:t>
             </a:fld>
             <a:endParaRPr lang="de-DE"/>
           </a:p>
@@ -1011,7 +1011,7 @@
           <a:p>
             <a:fld id="{D3EB3054-B75A-4BD7-8B3E-8DC0F614FAF3}" type="datetimeFigureOut">
               <a:rPr lang="de-DE" smtClean="0"/>
-              <a:t>16.11.2020</a:t>
+              <a:t>17.11.2020</a:t>
             </a:fld>
             <a:endParaRPr lang="de-DE"/>
           </a:p>
@@ -1240,7 +1240,7 @@
           <a:p>
             <a:fld id="{D3EB3054-B75A-4BD7-8B3E-8DC0F614FAF3}" type="datetimeFigureOut">
               <a:rPr lang="de-DE" smtClean="0"/>
-              <a:t>16.11.2020</a:t>
+              <a:t>17.11.2020</a:t>
             </a:fld>
             <a:endParaRPr lang="de-DE"/>
           </a:p>
@@ -1604,7 +1604,7 @@
           <a:p>
             <a:fld id="{D3EB3054-B75A-4BD7-8B3E-8DC0F614FAF3}" type="datetimeFigureOut">
               <a:rPr lang="de-DE" smtClean="0"/>
-              <a:t>16.11.2020</a:t>
+              <a:t>17.11.2020</a:t>
             </a:fld>
             <a:endParaRPr lang="de-DE"/>
           </a:p>
@@ -1721,7 +1721,7 @@
           <a:p>
             <a:fld id="{D3EB3054-B75A-4BD7-8B3E-8DC0F614FAF3}" type="datetimeFigureOut">
               <a:rPr lang="de-DE" smtClean="0"/>
-              <a:t>16.11.2020</a:t>
+              <a:t>17.11.2020</a:t>
             </a:fld>
             <a:endParaRPr lang="de-DE"/>
           </a:p>
@@ -1816,7 +1816,7 @@
           <a:p>
             <a:fld id="{D3EB3054-B75A-4BD7-8B3E-8DC0F614FAF3}" type="datetimeFigureOut">
               <a:rPr lang="de-DE" smtClean="0"/>
-              <a:t>16.11.2020</a:t>
+              <a:t>17.11.2020</a:t>
             </a:fld>
             <a:endParaRPr lang="de-DE"/>
           </a:p>
@@ -2091,7 +2091,7 @@
           <a:p>
             <a:fld id="{D3EB3054-B75A-4BD7-8B3E-8DC0F614FAF3}" type="datetimeFigureOut">
               <a:rPr lang="de-DE" smtClean="0"/>
-              <a:t>16.11.2020</a:t>
+              <a:t>17.11.2020</a:t>
             </a:fld>
             <a:endParaRPr lang="de-DE"/>
           </a:p>
@@ -2343,7 +2343,7 @@
           <a:p>
             <a:fld id="{D3EB3054-B75A-4BD7-8B3E-8DC0F614FAF3}" type="datetimeFigureOut">
               <a:rPr lang="de-DE" smtClean="0"/>
-              <a:t>16.11.2020</a:t>
+              <a:t>17.11.2020</a:t>
             </a:fld>
             <a:endParaRPr lang="de-DE"/>
           </a:p>
@@ -2554,7 +2554,7 @@
           <a:p>
             <a:fld id="{D3EB3054-B75A-4BD7-8B3E-8DC0F614FAF3}" type="datetimeFigureOut">
               <a:rPr lang="de-DE" smtClean="0"/>
-              <a:t>16.11.2020</a:t>
+              <a:t>17.11.2020</a:t>
             </a:fld>
             <a:endParaRPr lang="de-DE"/>
           </a:p>
@@ -4896,7 +4896,23 @@
                   <a:schemeClr val="bg1"/>
                 </a:solidFill>
               </a:rPr>
-              <a:t>no pause -&gt; n steps pause</a:t>
+              <a:t>no </a:t>
+            </a:r>
+            <a:r>
+              <a:rPr lang="en-GB" sz="1200">
+                <a:solidFill>
+                  <a:schemeClr val="bg1"/>
+                </a:solidFill>
+              </a:rPr>
+              <a:t>pause … </a:t>
+            </a:r>
+            <a:r>
+              <a:rPr lang="en-GB" sz="1200" dirty="0">
+                <a:solidFill>
+                  <a:schemeClr val="bg1"/>
+                </a:solidFill>
+              </a:rPr>
+              <a:t>n steps pause</a:t>
             </a:r>
           </a:p>
         </p:txBody>
@@ -11196,9 +11212,12 @@
 </file>
 
 <file path=customXml/item1.xml><?xml version="1.0" encoding="utf-8"?>
-<p:properties xmlns:p="http://schemas.microsoft.com/office/2006/metadata/properties" xmlns:xsi="http://www.w3.org/2001/XMLSchema-instance" xmlns:pc="http://schemas.microsoft.com/office/infopath/2007/PartnerControls">
-  <documentManagement/>
-</p:properties>
+<?mso-contentType ?>
+<FormTemplates xmlns="http://schemas.microsoft.com/sharepoint/v3/contenttype/forms">
+  <Display>DocumentLibraryForm</Display>
+  <Edit>DocumentLibraryForm</Edit>
+  <New>DocumentLibraryForm</New>
+</FormTemplates>
 </file>
 
 <file path=customXml/item2.xml><?xml version="1.0" encoding="utf-8"?>
@@ -11348,26 +11367,15 @@
 </file>
 
 <file path=customXml/item3.xml><?xml version="1.0" encoding="utf-8"?>
-<?mso-contentType ?>
-<FormTemplates xmlns="http://schemas.microsoft.com/sharepoint/v3/contenttype/forms">
-  <Display>DocumentLibraryForm</Display>
-  <Edit>DocumentLibraryForm</Edit>
-  <New>DocumentLibraryForm</New>
-</FormTemplates>
+<p:properties xmlns:p="http://schemas.microsoft.com/office/2006/metadata/properties" xmlns:xsi="http://www.w3.org/2001/XMLSchema-instance" xmlns:pc="http://schemas.microsoft.com/office/infopath/2007/PartnerControls">
+  <documentManagement/>
+</p:properties>
 </file>
 
 <file path=customXml/itemProps1.xml><?xml version="1.0" encoding="utf-8"?>
-<ds:datastoreItem xmlns:ds="http://schemas.openxmlformats.org/officeDocument/2006/customXml" ds:itemID="{B111369F-841E-4499-8860-ACB5045CEC00}">
+<ds:datastoreItem xmlns:ds="http://schemas.openxmlformats.org/officeDocument/2006/customXml" ds:itemID="{4E70509A-51F1-449D-A20D-C92EB9A4F9DF}">
   <ds:schemaRefs>
-    <ds:schemaRef ds:uri="http://schemas.microsoft.com/office/2006/metadata/properties"/>
-    <ds:schemaRef ds:uri="http://www.w3.org/XML/1998/namespace"/>
-    <ds:schemaRef ds:uri="0ca4519e-f7ae-4716-9300-8b80674a5553"/>
-    <ds:schemaRef ds:uri="http://schemas.openxmlformats.org/package/2006/metadata/core-properties"/>
-    <ds:schemaRef ds:uri="http://schemas.microsoft.com/office/infopath/2007/PartnerControls"/>
-    <ds:schemaRef ds:uri="http://schemas.microsoft.com/office/2006/documentManagement/types"/>
-    <ds:schemaRef ds:uri="http://purl.org/dc/dcmitype/"/>
-    <ds:schemaRef ds:uri="http://purl.org/dc/terms/"/>
-    <ds:schemaRef ds:uri="http://purl.org/dc/elements/1.1/"/>
+    <ds:schemaRef ds:uri="http://schemas.microsoft.com/sharepoint/v3/contenttype/forms"/>
   </ds:schemaRefs>
 </ds:datastoreItem>
 </file>
@@ -11391,9 +11399,17 @@
 </file>
 
 <file path=customXml/itemProps3.xml><?xml version="1.0" encoding="utf-8"?>
-<ds:datastoreItem xmlns:ds="http://schemas.openxmlformats.org/officeDocument/2006/customXml" ds:itemID="{4E70509A-51F1-449D-A20D-C92EB9A4F9DF}">
+<ds:datastoreItem xmlns:ds="http://schemas.openxmlformats.org/officeDocument/2006/customXml" ds:itemID="{B111369F-841E-4499-8860-ACB5045CEC00}">
   <ds:schemaRefs>
-    <ds:schemaRef ds:uri="http://schemas.microsoft.com/sharepoint/v3/contenttype/forms"/>
+    <ds:schemaRef ds:uri="http://schemas.microsoft.com/office/2006/metadata/properties"/>
+    <ds:schemaRef ds:uri="http://www.w3.org/XML/1998/namespace"/>
+    <ds:schemaRef ds:uri="0ca4519e-f7ae-4716-9300-8b80674a5553"/>
+    <ds:schemaRef ds:uri="http://schemas.openxmlformats.org/package/2006/metadata/core-properties"/>
+    <ds:schemaRef ds:uri="http://schemas.microsoft.com/office/infopath/2007/PartnerControls"/>
+    <ds:schemaRef ds:uri="http://schemas.microsoft.com/office/2006/documentManagement/types"/>
+    <ds:schemaRef ds:uri="http://purl.org/dc/dcmitype/"/>
+    <ds:schemaRef ds:uri="http://purl.org/dc/terms/"/>
+    <ds:schemaRef ds:uri="http://purl.org/dc/elements/1.1/"/>
   </ds:schemaRefs>
 </ds:datastoreItem>
 </file>
</xml_diff>